<commit_message>
tweak 'more links' slide
</commit_message>
<xml_diff>
--- a/commondotnet.pptx
+++ b/commondotnet.pptx
@@ -7871,7 +7871,7 @@
           <a:p>
             <a:fld id="{0E0973AF-55A1-EE44-9E80-14F04A0A1E69}" type="datetimeFigureOut">
               <a:rPr lang="en-US" smtClean="0"/>
-              <a:t>2016-09-17</a:t>
+              <a:t>2016-10-07</a:t>
             </a:fld>
             <a:endParaRPr lang="en-US"/>
           </a:p>
@@ -10146,7 +10146,7 @@
           <a:effectLst/>
           <a:extLst>
             <a:ext uri="{91240B29-F687-4f45-9708-019B960494DF}">
-              <a14:hiddenLine xmlns="" xmlns:a14="http://schemas.microsoft.com/office/drawing/2010/main" w="9525">
+              <a14:hiddenLine xmlns:a14="http://schemas.microsoft.com/office/drawing/2010/main" xmlns="" w="9525">
                 <a:solidFill>
                   <a:srgbClr val="000000"/>
                 </a:solidFill>
@@ -10309,7 +10309,7 @@
           <a:p>
             <a:fld id="{B9712966-289B-6447-B773-0F3263DBE8E6}" type="datetime1">
               <a:rPr lang="en-US" smtClean="0"/>
-              <a:t>2016-09-17</a:t>
+              <a:t>2016-10-07</a:t>
             </a:fld>
             <a:endParaRPr lang="en-US" dirty="0"/>
           </a:p>
@@ -10668,7 +10668,7 @@
           <a:p>
             <a:fld id="{52F444AA-4FC3-8941-AF83-55386EAA9401}" type="datetime1">
               <a:rPr lang="en-US" smtClean="0"/>
-              <a:t>2016-09-17</a:t>
+              <a:t>2016-10-07</a:t>
             </a:fld>
             <a:endParaRPr lang="en-US" dirty="0"/>
           </a:p>
@@ -11189,7 +11189,7 @@
           <a:p>
             <a:fld id="{7F0F7CC7-FC2D-9F41-B3FA-7078415FBD74}" type="datetime1">
               <a:rPr lang="en-US" smtClean="0"/>
-              <a:t>2016-09-17</a:t>
+              <a:t>2016-10-07</a:t>
             </a:fld>
             <a:endParaRPr lang="en-US" dirty="0"/>
           </a:p>
@@ -11598,7 +11598,7 @@
           <a:p>
             <a:fld id="{E5CE92B4-4669-AF47-8898-D5749AC05E5D}" type="datetime1">
               <a:rPr lang="en-US" smtClean="0"/>
-              <a:t>2016-09-17</a:t>
+              <a:t>2016-10-07</a:t>
             </a:fld>
             <a:endParaRPr lang="en-US" dirty="0"/>
           </a:p>
@@ -11783,7 +11783,7 @@
           <a:ln/>
           <a:extLst>
             <a:ext uri="{91240B29-F687-4f45-9708-019B960494DF}">
-              <a14:hiddenLine xmlns="" xmlns:a14="http://schemas.microsoft.com/office/drawing/2010/main" w="9525">
+              <a14:hiddenLine xmlns:a14="http://schemas.microsoft.com/office/drawing/2010/main" xmlns="" w="9525">
                 <a:solidFill>
                   <a:srgbClr val="000000"/>
                 </a:solidFill>
@@ -11915,7 +11915,7 @@
           <a:p>
             <a:fld id="{BA03BD6C-A6D5-B04A-877E-8CCBBCD2C27F}" type="datetime1">
               <a:rPr lang="en-US" smtClean="0"/>
-              <a:t>2016-09-17</a:t>
+              <a:t>2016-10-07</a:t>
             </a:fld>
             <a:endParaRPr lang="en-US" dirty="0"/>
           </a:p>
@@ -12102,7 +12102,7 @@
           <a:ln/>
           <a:extLst>
             <a:ext uri="{91240B29-F687-4f45-9708-019B960494DF}">
-              <a14:hiddenLine xmlns="" xmlns:a14="http://schemas.microsoft.com/office/drawing/2010/main" w="9525">
+              <a14:hiddenLine xmlns:a14="http://schemas.microsoft.com/office/drawing/2010/main" xmlns="" w="9525">
                 <a:solidFill>
                   <a:srgbClr val="000000"/>
                 </a:solidFill>
@@ -12244,7 +12244,7 @@
           <a:p>
             <a:fld id="{55FB1CCF-54A3-6D44-B028-DC7C890AD276}" type="datetime1">
               <a:rPr lang="en-US" smtClean="0"/>
-              <a:t>2016-09-17</a:t>
+              <a:t>2016-10-07</a:t>
             </a:fld>
             <a:endParaRPr lang="en-US" dirty="0"/>
           </a:p>
@@ -12429,7 +12429,7 @@
           <a:ln/>
           <a:extLst>
             <a:ext uri="{91240B29-F687-4f45-9708-019B960494DF}">
-              <a14:hiddenLine xmlns="" xmlns:a14="http://schemas.microsoft.com/office/drawing/2010/main" w="9525">
+              <a14:hiddenLine xmlns:a14="http://schemas.microsoft.com/office/drawing/2010/main" xmlns="" w="9525">
                 <a:solidFill>
                   <a:srgbClr val="000000"/>
                 </a:solidFill>
@@ -12564,7 +12564,7 @@
           <a:p>
             <a:fld id="{8CE3AFF1-8966-CF42-82E7-FDEA487D1BBC}" type="datetime1">
               <a:rPr lang="en-US" smtClean="0"/>
-              <a:t>2016-09-17</a:t>
+              <a:t>2016-10-07</a:t>
             </a:fld>
             <a:endParaRPr lang="en-US" dirty="0"/>
           </a:p>
@@ -12940,7 +12940,7 @@
           <a:p>
             <a:fld id="{AD738595-419A-7A4C-AC17-85AE5E021F25}" type="datetime1">
               <a:rPr lang="en-US" smtClean="0"/>
-              <a:t>2016-09-17</a:t>
+              <a:t>2016-10-07</a:t>
             </a:fld>
             <a:endParaRPr lang="en-US" dirty="0"/>
           </a:p>
@@ -13125,7 +13125,7 @@
           <a:ln/>
           <a:extLst>
             <a:ext uri="{91240B29-F687-4f45-9708-019B960494DF}">
-              <a14:hiddenLine xmlns="" xmlns:a14="http://schemas.microsoft.com/office/drawing/2010/main" w="9525">
+              <a14:hiddenLine xmlns:a14="http://schemas.microsoft.com/office/drawing/2010/main" xmlns="" w="9525">
                 <a:solidFill>
                   <a:srgbClr val="000000"/>
                 </a:solidFill>
@@ -13323,7 +13323,7 @@
           <a:p>
             <a:fld id="{FC0235DF-6EB8-6846-B2F2-8024D0BC663C}" type="datetime1">
               <a:rPr lang="en-US" smtClean="0"/>
-              <a:t>2016-09-17</a:t>
+              <a:t>2016-10-07</a:t>
             </a:fld>
             <a:endParaRPr lang="en-US" dirty="0"/>
           </a:p>
@@ -13508,7 +13508,7 @@
           <a:ln/>
           <a:extLst>
             <a:ext uri="{91240B29-F687-4f45-9708-019B960494DF}">
-              <a14:hiddenLine xmlns="" xmlns:a14="http://schemas.microsoft.com/office/drawing/2010/main" w="9525">
+              <a14:hiddenLine xmlns:a14="http://schemas.microsoft.com/office/drawing/2010/main" xmlns="" w="9525">
                 <a:solidFill>
                   <a:srgbClr val="000000"/>
                 </a:solidFill>
@@ -13840,7 +13840,7 @@
           <a:p>
             <a:fld id="{890CEA71-B545-204A-9465-5C14FAC3CDB3}" type="datetime1">
               <a:rPr lang="en-US" smtClean="0"/>
-              <a:t>2016-09-17</a:t>
+              <a:t>2016-10-07</a:t>
             </a:fld>
             <a:endParaRPr lang="en-US" dirty="0"/>
           </a:p>
@@ -14025,7 +14025,7 @@
           <a:ln/>
           <a:extLst>
             <a:ext uri="{91240B29-F687-4f45-9708-019B960494DF}">
-              <a14:hiddenLine xmlns="" xmlns:a14="http://schemas.microsoft.com/office/drawing/2010/main" w="9525">
+              <a14:hiddenLine xmlns:a14="http://schemas.microsoft.com/office/drawing/2010/main" xmlns="" w="9525">
                 <a:solidFill>
                   <a:srgbClr val="000000"/>
                 </a:solidFill>
@@ -14098,7 +14098,7 @@
           <a:p>
             <a:fld id="{E4BC9A2E-E0CD-1B43-8128-D8CBB0F81482}" type="datetime1">
               <a:rPr lang="en-US" smtClean="0"/>
-              <a:t>2016-09-17</a:t>
+              <a:t>2016-10-07</a:t>
             </a:fld>
             <a:endParaRPr lang="en-US" dirty="0"/>
           </a:p>
@@ -14223,7 +14223,7 @@
           <a:p>
             <a:fld id="{BD192A68-846A-CE4F-A2CD-58521084FF33}" type="datetime1">
               <a:rPr lang="en-US" smtClean="0"/>
-              <a:t>2016-09-17</a:t>
+              <a:t>2016-10-07</a:t>
             </a:fld>
             <a:endParaRPr lang="en-US" dirty="0"/>
           </a:p>
@@ -14521,7 +14521,7 @@
           <a:ln/>
           <a:extLst>
             <a:ext uri="{91240B29-F687-4f45-9708-019B960494DF}">
-              <a14:hiddenLine xmlns="" xmlns:a14="http://schemas.microsoft.com/office/drawing/2010/main" w="9525">
+              <a14:hiddenLine xmlns:a14="http://schemas.microsoft.com/office/drawing/2010/main" xmlns="" w="9525">
                 <a:solidFill>
                   <a:srgbClr val="000000"/>
                 </a:solidFill>
@@ -14723,7 +14723,7 @@
           <a:p>
             <a:fld id="{7570EE54-6A00-9A45-B449-5AF5530F0C36}" type="datetime1">
               <a:rPr lang="en-US" smtClean="0"/>
-              <a:t>2016-09-17</a:t>
+              <a:t>2016-10-07</a:t>
             </a:fld>
             <a:endParaRPr lang="en-US" dirty="0"/>
           </a:p>
@@ -15069,7 +15069,7 @@
           <a:p>
             <a:fld id="{28183003-BF4D-DC49-8AF4-1AB66511F885}" type="datetime1">
               <a:rPr lang="en-US" smtClean="0"/>
-              <a:t>2016-09-17</a:t>
+              <a:t>2016-10-07</a:t>
             </a:fld>
             <a:endParaRPr lang="en-US" dirty="0"/>
           </a:p>
@@ -15382,7 +15382,7 @@
           <a:p>
             <a:fld id="{B9712966-289B-6447-B773-0F3263DBE8E6}" type="datetime1">
               <a:rPr lang="en-US" smtClean="0"/>
-              <a:t>2016-09-17</a:t>
+              <a:t>2016-10-07</a:t>
             </a:fld>
             <a:endParaRPr lang="en-US" dirty="0"/>
           </a:p>
@@ -16181,16 +16181,10 @@
               <a:buChar char="o"/>
             </a:pPr>
             <a:r>
-              <a:rPr lang="en-US" sz="1600" dirty="0" err="1">
-                <a:hlinkClick r:id="rId6"/>
-              </a:rPr>
-              <a:t>github.com</a:t>
-            </a:r>
-            <a:r>
               <a:rPr lang="en-US" sz="1600" dirty="0">
                 <a:hlinkClick r:id="rId6"/>
               </a:rPr>
-              <a:t>/</a:t>
+              <a:t>gitlab.com/</a:t>
             </a:r>
             <a:r>
               <a:rPr lang="en-US" sz="1600" dirty="0" err="1">
@@ -16468,13 +16462,13 @@
   <p:clrMapOvr>
     <a:masterClrMapping/>
   </p:clrMapOvr>
-  <mc:AlternateContent xmlns:mc="http://schemas.openxmlformats.org/markup-compatibility/2006">
-    <mc:Choice xmlns:p15="http://schemas.microsoft.com/office/powerpoint/2012/main" Requires="p15">
+  <mc:AlternateContent xmlns:mc="http://schemas.openxmlformats.org/markup-compatibility/2006" xmlns:p15="http://schemas.microsoft.com/office/powerpoint/2012/main">
+    <mc:Choice Requires="p15">
       <p:transition xmlns:p14="http://schemas.microsoft.com/office/powerpoint/2010/main" spd="slow" p14:dur="2000">
         <p15:prstTrans prst="fallOver"/>
       </p:transition>
     </mc:Choice>
-    <mc:Fallback>
+    <mc:Fallback xmlns="">
       <p:transition spd="slow">
         <p:fade/>
       </p:transition>

</xml_diff>